<commit_message>
ch10 first all read
</commit_message>
<xml_diff>
--- a/ch10.pptx
+++ b/ch10.pptx
@@ -3251,8 +3251,28 @@
           <a:bodyPr/>
           <a:lstStyle/>
           <a:p>
+            <a:r>
+              <a:rPr lang="en-US" altLang="zh-TW" sz="1200" dirty="0">
+                <a:ea typeface="新細明體" charset="-120"/>
+              </a:rPr>
+              <a:t>desirable  </a:t>
+            </a:r>
+            <a:r>
+              <a:rPr lang="zh-TW" altLang="en-US" sz="1200" b="0" i="0" kern="1200" dirty="0">
+                <a:solidFill>
+                  <a:schemeClr val="tx1"/>
+                </a:solidFill>
+                <a:effectLst/>
+                <a:latin typeface="Times New Roman" charset="0"/>
+                <a:ea typeface="MS PGothic" pitchFamily="34" charset="-128"/>
+                <a:cs typeface="ＭＳ Ｐゴシック" charset="-128"/>
+              </a:rPr>
+              <a:t>值得嚮往的</a:t>
+            </a:r>
+          </a:p>
+          <a:p>
             <a:pPr eaLnBrk="1" hangingPunct="1"/>
-            <a:endParaRPr lang="zh-TW" altLang="zh-TW"/>
+            <a:endParaRPr lang="zh-TW" altLang="zh-TW" dirty="0"/>
           </a:p>
         </p:txBody>
       </p:sp>
@@ -28531,7 +28551,17 @@
               <a:rPr lang="en-US" altLang="zh-TW" sz="2800" dirty="0">
                 <a:ea typeface="新細明體" charset="-120"/>
               </a:rPr>
-              <a:t> seamlessly using </a:t>
+              <a:t> seamlessly</a:t>
+            </a:r>
+            <a:r>
+              <a:rPr lang="zh-TW" altLang="en-US" b="0" dirty="0"/>
+              <a:t> 無縫地</a:t>
+            </a:r>
+            <a:r>
+              <a:rPr lang="en-US" altLang="zh-TW" sz="2800" dirty="0">
+                <a:ea typeface="新細明體" charset="-120"/>
+              </a:rPr>
+              <a:t> using </a:t>
             </a:r>
             <a:r>
               <a:rPr lang="en-US" altLang="zh-TW" sz="2800" b="1" dirty="0">
@@ -30094,6 +30124,15 @@
                 <a:ea typeface="新細明體" charset="-120"/>
               </a:rPr>
               <a:t>Consistency semantics</a:t>
+            </a:r>
+            <a:r>
+              <a:rPr lang="zh-TW" altLang="en-US" sz="2800" b="1" dirty="0">
+                <a:solidFill>
+                  <a:srgbClr val="FF0000"/>
+                </a:solidFill>
+                <a:ea typeface="新細明體" charset="-120"/>
+              </a:rPr>
+              <a:t>語意</a:t>
             </a:r>
             <a:r>
               <a:rPr lang="en-US" altLang="zh-TW" sz="2800" dirty="0">

</xml_diff>